<commit_message>
v0.02 now makes use of gwloggerR for outlier detection
</commit_message>
<xml_diff>
--- a/presentation/groundwater_followup.pptx
+++ b/presentation/groundwater_followup.pptx
@@ -5,34 +5,35 @@
     <p:sldMasterId id="2147483648" r:id="rId1"/>
   </p:sldMasterIdLst>
   <p:notesMasterIdLst>
-    <p:notesMasterId r:id="rId27"/>
+    <p:notesMasterId r:id="rId28"/>
   </p:notesMasterIdLst>
   <p:sldIdLst>
     <p:sldId id="283" r:id="rId2"/>
-    <p:sldId id="256" r:id="rId3"/>
-    <p:sldId id="257" r:id="rId4"/>
-    <p:sldId id="274" r:id="rId5"/>
-    <p:sldId id="258" r:id="rId6"/>
-    <p:sldId id="259" r:id="rId7"/>
-    <p:sldId id="260" r:id="rId8"/>
-    <p:sldId id="261" r:id="rId9"/>
-    <p:sldId id="262" r:id="rId10"/>
-    <p:sldId id="263" r:id="rId11"/>
-    <p:sldId id="264" r:id="rId12"/>
-    <p:sldId id="266" r:id="rId13"/>
-    <p:sldId id="275" r:id="rId14"/>
-    <p:sldId id="268" r:id="rId15"/>
-    <p:sldId id="267" r:id="rId16"/>
-    <p:sldId id="269" r:id="rId17"/>
-    <p:sldId id="270" r:id="rId18"/>
-    <p:sldId id="265" r:id="rId19"/>
-    <p:sldId id="273" r:id="rId20"/>
-    <p:sldId id="271" r:id="rId21"/>
-    <p:sldId id="272" r:id="rId22"/>
-    <p:sldId id="282" r:id="rId23"/>
-    <p:sldId id="277" r:id="rId24"/>
-    <p:sldId id="279" r:id="rId25"/>
-    <p:sldId id="281" r:id="rId26"/>
+    <p:sldId id="284" r:id="rId3"/>
+    <p:sldId id="256" r:id="rId4"/>
+    <p:sldId id="257" r:id="rId5"/>
+    <p:sldId id="274" r:id="rId6"/>
+    <p:sldId id="258" r:id="rId7"/>
+    <p:sldId id="259" r:id="rId8"/>
+    <p:sldId id="260" r:id="rId9"/>
+    <p:sldId id="261" r:id="rId10"/>
+    <p:sldId id="262" r:id="rId11"/>
+    <p:sldId id="263" r:id="rId12"/>
+    <p:sldId id="264" r:id="rId13"/>
+    <p:sldId id="266" r:id="rId14"/>
+    <p:sldId id="275" r:id="rId15"/>
+    <p:sldId id="268" r:id="rId16"/>
+    <p:sldId id="267" r:id="rId17"/>
+    <p:sldId id="269" r:id="rId18"/>
+    <p:sldId id="270" r:id="rId19"/>
+    <p:sldId id="265" r:id="rId20"/>
+    <p:sldId id="273" r:id="rId21"/>
+    <p:sldId id="271" r:id="rId22"/>
+    <p:sldId id="272" r:id="rId23"/>
+    <p:sldId id="282" r:id="rId24"/>
+    <p:sldId id="277" r:id="rId25"/>
+    <p:sldId id="279" r:id="rId26"/>
+    <p:sldId id="281" r:id="rId27"/>
   </p:sldIdLst>
   <p:sldSz cx="12192000" cy="6858000"/>
   <p:notesSz cx="6858000" cy="9144000"/>
@@ -137,6 +138,7 @@
         <p14:section name="Default Section" id="{F1B1DCC2-59F7-47FB-B72F-030298CE1019}">
           <p14:sldIdLst>
             <p14:sldId id="283"/>
+            <p14:sldId id="284"/>
           </p14:sldIdLst>
         </p14:section>
         <p14:section name="Sprint 1 (28/05/2019)" id="{EEA03BA1-9B17-4993-9E06-3DC43F3AC1F5}">
@@ -179,7 +181,7 @@
 <file path=ppt/revisionInfo.xml><?xml version="1.0" encoding="utf-8"?>
 <p1510:revInfo xmlns:a="http://schemas.openxmlformats.org/drawingml/2006/main" xmlns:r="http://schemas.openxmlformats.org/officeDocument/2006/relationships" xmlns:p1510="http://schemas.microsoft.com/office/powerpoint/2015/10/main">
   <p1510:revLst>
-    <p1510:client id="{2B2E02C9-F92B-46B7-AEE7-BDDE26A8B4F0}" v="147" dt="2019-05-29T06:26:16.436"/>
+    <p1510:client id="{F5091CEC-A69F-4B4D-BF1D-9B075408F942}" v="70" dt="2019-06-02T12:19:00.522"/>
   </p1510:revLst>
 </p1510:revInfo>
 </file>
@@ -247,21 +249,6 @@
           </ac:picMkLst>
         </pc:picChg>
       </pc:sldChg>
-      <pc:sldChg chg="modSp add del">
-        <pc:chgData name="Davor Josipovic" userId="c5beaa7c1ac2955a" providerId="LiveId" clId="{2B2E02C9-F92B-46B7-AEE7-BDDE26A8B4F0}" dt="2019-05-28T11:30:59.363" v="121" actId="2696"/>
-        <pc:sldMkLst>
-          <pc:docMk/>
-          <pc:sldMk cId="334428716" sldId="283"/>
-        </pc:sldMkLst>
-        <pc:spChg chg="mod">
-          <ac:chgData name="Davor Josipovic" userId="c5beaa7c1ac2955a" providerId="LiveId" clId="{2B2E02C9-F92B-46B7-AEE7-BDDE26A8B4F0}" dt="2019-05-28T11:30:55.920" v="120" actId="20577"/>
-          <ac:spMkLst>
-            <pc:docMk/>
-            <pc:sldMk cId="334428716" sldId="283"/>
-            <ac:spMk id="3" creationId="{EC34D422-AE72-4112-8B81-165A796C3472}"/>
-          </ac:spMkLst>
-        </pc:spChg>
-      </pc:sldChg>
       <pc:sldChg chg="modSp add">
         <pc:chgData name="Davor Josipovic" userId="c5beaa7c1ac2955a" providerId="LiveId" clId="{2B2E02C9-F92B-46B7-AEE7-BDDE26A8B4F0}" dt="2019-05-29T06:25:48.418" v="143" actId="20577"/>
         <pc:sldMkLst>
@@ -295,6 +282,69 @@
       </pc:sldChg>
     </pc:docChg>
   </pc:docChgLst>
+  <pc:docChgLst>
+    <pc:chgData name="Davor Josipovic" userId="c5beaa7c1ac2955a" providerId="LiveId" clId="{F5091CEC-A69F-4B4D-BF1D-9B075408F942}"/>
+    <pc:docChg chg="undo custSel addSld modSld">
+      <pc:chgData name="Davor Josipovic" userId="c5beaa7c1ac2955a" providerId="LiveId" clId="{F5091CEC-A69F-4B4D-BF1D-9B075408F942}" dt="2019-06-02T12:19:00.522" v="66" actId="20577"/>
+      <pc:docMkLst>
+        <pc:docMk/>
+      </pc:docMkLst>
+      <pc:sldChg chg="addSp delSp modSp">
+        <pc:chgData name="Davor Josipovic" userId="c5beaa7c1ac2955a" providerId="LiveId" clId="{F5091CEC-A69F-4B4D-BF1D-9B075408F942}" dt="2019-06-02T12:16:25.668" v="17"/>
+        <pc:sldMkLst>
+          <pc:docMk/>
+          <pc:sldMk cId="1027892247" sldId="268"/>
+        </pc:sldMkLst>
+        <pc:picChg chg="add del mod">
+          <ac:chgData name="Davor Josipovic" userId="c5beaa7c1ac2955a" providerId="LiveId" clId="{F5091CEC-A69F-4B4D-BF1D-9B075408F942}" dt="2019-06-02T12:16:25.668" v="17"/>
+          <ac:picMkLst>
+            <pc:docMk/>
+            <pc:sldMk cId="1027892247" sldId="268"/>
+            <ac:picMk id="4" creationId="{96C7B94B-AD3E-4E53-8A09-B79A3EF4E2AA}"/>
+          </ac:picMkLst>
+        </pc:picChg>
+        <pc:picChg chg="add del">
+          <ac:chgData name="Davor Josipovic" userId="c5beaa7c1ac2955a" providerId="LiveId" clId="{F5091CEC-A69F-4B4D-BF1D-9B075408F942}" dt="2019-06-02T12:16:24.673" v="13" actId="478"/>
+          <ac:picMkLst>
+            <pc:docMk/>
+            <pc:sldMk cId="1027892247" sldId="268"/>
+            <ac:picMk id="5" creationId="{A40A20E4-D624-4ABD-983D-0A45F9E972ED}"/>
+          </ac:picMkLst>
+        </pc:picChg>
+        <pc:picChg chg="add del">
+          <ac:chgData name="Davor Josipovic" userId="c5beaa7c1ac2955a" providerId="LiveId" clId="{F5091CEC-A69F-4B4D-BF1D-9B075408F942}" dt="2019-06-02T12:16:25.358" v="16" actId="478"/>
+          <ac:picMkLst>
+            <pc:docMk/>
+            <pc:sldMk cId="1027892247" sldId="268"/>
+            <ac:picMk id="6" creationId="{B3191E96-9D61-4C62-8040-AFA5B524F0E6}"/>
+          </ac:picMkLst>
+        </pc:picChg>
+        <pc:picChg chg="add del mod">
+          <ac:chgData name="Davor Josipovic" userId="c5beaa7c1ac2955a" providerId="LiveId" clId="{F5091CEC-A69F-4B4D-BF1D-9B075408F942}" dt="2019-06-02T12:16:24.486" v="12"/>
+          <ac:picMkLst>
+            <pc:docMk/>
+            <pc:sldMk cId="1027892247" sldId="268"/>
+            <ac:picMk id="7" creationId="{D5443115-89B2-43AE-8A8A-C41E2443C31F}"/>
+          </ac:picMkLst>
+        </pc:picChg>
+      </pc:sldChg>
+      <pc:sldChg chg="modSp add modNotesTx">
+        <pc:chgData name="Davor Josipovic" userId="c5beaa7c1ac2955a" providerId="LiveId" clId="{F5091CEC-A69F-4B4D-BF1D-9B075408F942}" dt="2019-06-02T12:19:00.522" v="66" actId="20577"/>
+        <pc:sldMkLst>
+          <pc:docMk/>
+          <pc:sldMk cId="2196440616" sldId="284"/>
+        </pc:sldMkLst>
+        <pc:spChg chg="mod">
+          <ac:chgData name="Davor Josipovic" userId="c5beaa7c1ac2955a" providerId="LiveId" clId="{F5091CEC-A69F-4B4D-BF1D-9B075408F942}" dt="2019-06-02T12:19:00.522" v="66" actId="20577"/>
+          <ac:spMkLst>
+            <pc:docMk/>
+            <pc:sldMk cId="2196440616" sldId="284"/>
+            <ac:spMk id="2" creationId="{6D80A9A5-3296-40DF-AB8B-E1B2FFA1A316}"/>
+          </ac:spMkLst>
+        </pc:spChg>
+      </pc:sldChg>
+    </pc:docChg>
+  </pc:docChgLst>
 </pc:chgInfo>
 </file>
 
@@ -380,7 +430,7 @@
           <a:p>
             <a:fld id="{70D3FD57-3918-4789-8259-B6861B793F5F}" type="datetimeFigureOut">
               <a:rPr lang="en-US" smtClean="0"/>
-              <a:t>5/28/2019</a:t>
+              <a:t>6/2/2019</a:t>
             </a:fld>
             <a:endParaRPr lang="en-US"/>
           </a:p>
@@ -692,60 +742,14 @@
           <a:lstStyle/>
           <a:p>
             <a:r>
-              <a:rPr lang="en-US" dirty="0" err="1"/>
-              <a:t>Tresholds</a:t>
-            </a:r>
-            <a:r>
               <a:rPr lang="en-US" dirty="0"/>
-              <a:t> </a:t>
-            </a:r>
-            <a:r>
-              <a:rPr lang="en-US" dirty="0" err="1"/>
-              <a:t>voor</a:t>
-            </a:r>
+              <a:t>Excluded: BAOL089|BAOL079|BAOL006</a:t>
+            </a:r>
+          </a:p>
+          <a:p>
             <a:r>
               <a:rPr lang="en-US" dirty="0"/>
-              <a:t> outliers </a:t>
-            </a:r>
-            <a:r>
-              <a:rPr lang="en-US" dirty="0" err="1"/>
-              <a:t>kunnen</a:t>
-            </a:r>
-            <a:r>
-              <a:rPr lang="en-US" dirty="0"/>
-              <a:t> </a:t>
-            </a:r>
-            <a:r>
-              <a:rPr lang="en-US" dirty="0" err="1"/>
-              <a:t>berekend</a:t>
-            </a:r>
-            <a:r>
-              <a:rPr lang="en-US" dirty="0"/>
-              <a:t> </a:t>
-            </a:r>
-            <a:r>
-              <a:rPr lang="en-US" dirty="0" err="1"/>
-              <a:t>worden</a:t>
-            </a:r>
-            <a:r>
-              <a:rPr lang="en-US" dirty="0"/>
-              <a:t> op basis van </a:t>
-            </a:r>
-            <a:r>
-              <a:rPr lang="en-US" dirty="0" err="1"/>
-              <a:t>handmatige</a:t>
-            </a:r>
-            <a:r>
-              <a:rPr lang="en-US" dirty="0"/>
-              <a:t> prior </a:t>
-            </a:r>
-            <a:r>
-              <a:rPr lang="en-US" dirty="0" err="1"/>
-              <a:t>analyse</a:t>
-            </a:r>
-            <a:r>
-              <a:rPr lang="en-US" dirty="0"/>
-              <a:t>, of </a:t>
+              <a:t>Range: 800 &lt; x &lt; 1200</a:t>
             </a:r>
           </a:p>
         </p:txBody>
@@ -767,7 +771,7 @@
           <a:p>
             <a:fld id="{CDFDF6FA-C9C5-403D-8A8F-838FF3722E4D}" type="slidenum">
               <a:rPr lang="en-US" smtClean="0"/>
-              <a:t>18</a:t>
+              <a:t>2</a:t>
             </a:fld>
             <a:endParaRPr lang="en-US"/>
           </a:p>
@@ -776,7 +780,7 @@
     </p:spTree>
     <p:extLst>
       <p:ext uri="{BB962C8B-B14F-4D97-AF65-F5344CB8AC3E}">
-        <p14:creationId xmlns:p14="http://schemas.microsoft.com/office/powerpoint/2010/main" val="1010105218"/>
+        <p14:creationId xmlns:p14="http://schemas.microsoft.com/office/powerpoint/2010/main" val="640992638"/>
       </p:ext>
     </p:extLst>
   </p:cSld>
@@ -832,15 +836,7 @@
           <a:p>
             <a:r>
               <a:rPr lang="en-US" dirty="0" err="1"/>
-              <a:t>Bijvoorbeeld</a:t>
-            </a:r>
-            <a:r>
-              <a:rPr lang="en-US" dirty="0"/>
-              <a:t>, </a:t>
-            </a:r>
-            <a:r>
-              <a:rPr lang="en-US" dirty="0" err="1"/>
-              <a:t>somige</a:t>
+              <a:t>Tresholds</a:t>
             </a:r>
             <a:r>
               <a:rPr lang="en-US" dirty="0"/>
@@ -848,7 +844,15 @@
             </a:r>
             <a:r>
               <a:rPr lang="en-US" dirty="0" err="1"/>
-              <a:t>regio’s</a:t>
+              <a:t>voor</a:t>
+            </a:r>
+            <a:r>
+              <a:rPr lang="en-US" dirty="0"/>
+              <a:t> outliers </a:t>
+            </a:r>
+            <a:r>
+              <a:rPr lang="en-US" dirty="0" err="1"/>
+              <a:t>kunnen</a:t>
             </a:r>
             <a:r>
               <a:rPr lang="en-US" dirty="0"/>
@@ -856,7 +860,7 @@
             </a:r>
             <a:r>
               <a:rPr lang="en-US" dirty="0" err="1"/>
-              <a:t>hebben</a:t>
+              <a:t>berekend</a:t>
             </a:r>
             <a:r>
               <a:rPr lang="en-US" dirty="0"/>
@@ -864,51 +868,27 @@
             </a:r>
             <a:r>
               <a:rPr lang="en-US" dirty="0" err="1"/>
-              <a:t>lagere</a:t>
+              <a:t>worden</a:t>
             </a:r>
             <a:r>
               <a:rPr lang="en-US" dirty="0"/>
-              <a:t> of </a:t>
+              <a:t> op basis van </a:t>
             </a:r>
             <a:r>
               <a:rPr lang="en-US" dirty="0" err="1"/>
-              <a:t>hogere</a:t>
+              <a:t>handmatige</a:t>
             </a:r>
             <a:r>
               <a:rPr lang="en-US" dirty="0"/>
-              <a:t> temperature, wat </a:t>
+              <a:t> prior </a:t>
             </a:r>
             <a:r>
               <a:rPr lang="en-US" dirty="0" err="1"/>
-              <a:t>resulteert</a:t>
+              <a:t>analyse</a:t>
             </a:r>
             <a:r>
               <a:rPr lang="en-US" dirty="0"/>
-              <a:t> in </a:t>
-            </a:r>
-            <a:r>
-              <a:rPr lang="en-US" dirty="0" err="1"/>
-              <a:t>hogere</a:t>
-            </a:r>
-            <a:r>
-              <a:rPr lang="en-US" dirty="0"/>
-              <a:t> of </a:t>
-            </a:r>
-            <a:r>
-              <a:rPr lang="en-US" dirty="0" err="1"/>
-              <a:t>lagere</a:t>
-            </a:r>
-            <a:r>
-              <a:rPr lang="en-US" dirty="0"/>
-              <a:t> </a:t>
-            </a:r>
-            <a:r>
-              <a:rPr lang="en-US" dirty="0" err="1"/>
-              <a:t>luchtdruk</a:t>
-            </a:r>
-            <a:r>
-              <a:rPr lang="en-US" dirty="0"/>
-              <a:t>.</a:t>
+              <a:t>, of </a:t>
             </a:r>
           </a:p>
         </p:txBody>
@@ -930,7 +910,7 @@
           <a:p>
             <a:fld id="{CDFDF6FA-C9C5-403D-8A8F-838FF3722E4D}" type="slidenum">
               <a:rPr lang="en-US" smtClean="0"/>
-              <a:t>20</a:t>
+              <a:t>19</a:t>
             </a:fld>
             <a:endParaRPr lang="en-US"/>
           </a:p>
@@ -939,7 +919,7 @@
     </p:spTree>
     <p:extLst>
       <p:ext uri="{BB962C8B-B14F-4D97-AF65-F5344CB8AC3E}">
-        <p14:creationId xmlns:p14="http://schemas.microsoft.com/office/powerpoint/2010/main" val="2763382228"/>
+        <p14:creationId xmlns:p14="http://schemas.microsoft.com/office/powerpoint/2010/main" val="1010105218"/>
       </p:ext>
     </p:extLst>
   </p:cSld>
@@ -993,7 +973,86 @@
           <a:bodyPr/>
           <a:lstStyle/>
           <a:p>
-            <a:endParaRPr lang="en-US" dirty="0"/>
+            <a:r>
+              <a:rPr lang="en-US" dirty="0" err="1"/>
+              <a:t>Bijvoorbeeld</a:t>
+            </a:r>
+            <a:r>
+              <a:rPr lang="en-US" dirty="0"/>
+              <a:t>, </a:t>
+            </a:r>
+            <a:r>
+              <a:rPr lang="en-US" dirty="0" err="1"/>
+              <a:t>somige</a:t>
+            </a:r>
+            <a:r>
+              <a:rPr lang="en-US" dirty="0"/>
+              <a:t> </a:t>
+            </a:r>
+            <a:r>
+              <a:rPr lang="en-US" dirty="0" err="1"/>
+              <a:t>regio’s</a:t>
+            </a:r>
+            <a:r>
+              <a:rPr lang="en-US" dirty="0"/>
+              <a:t> </a:t>
+            </a:r>
+            <a:r>
+              <a:rPr lang="en-US" dirty="0" err="1"/>
+              <a:t>hebben</a:t>
+            </a:r>
+            <a:r>
+              <a:rPr lang="en-US" dirty="0"/>
+              <a:t> </a:t>
+            </a:r>
+            <a:r>
+              <a:rPr lang="en-US" dirty="0" err="1"/>
+              <a:t>lagere</a:t>
+            </a:r>
+            <a:r>
+              <a:rPr lang="en-US" dirty="0"/>
+              <a:t> of </a:t>
+            </a:r>
+            <a:r>
+              <a:rPr lang="en-US" dirty="0" err="1"/>
+              <a:t>hogere</a:t>
+            </a:r>
+            <a:r>
+              <a:rPr lang="en-US" dirty="0"/>
+              <a:t> temperature, wat </a:t>
+            </a:r>
+            <a:r>
+              <a:rPr lang="en-US" dirty="0" err="1"/>
+              <a:t>resulteert</a:t>
+            </a:r>
+            <a:r>
+              <a:rPr lang="en-US" dirty="0"/>
+              <a:t> in </a:t>
+            </a:r>
+            <a:r>
+              <a:rPr lang="en-US" dirty="0" err="1"/>
+              <a:t>hogere</a:t>
+            </a:r>
+            <a:r>
+              <a:rPr lang="en-US" dirty="0"/>
+              <a:t> of </a:t>
+            </a:r>
+            <a:r>
+              <a:rPr lang="en-US" dirty="0" err="1"/>
+              <a:t>lagere</a:t>
+            </a:r>
+            <a:r>
+              <a:rPr lang="en-US" dirty="0"/>
+              <a:t> </a:t>
+            </a:r>
+            <a:r>
+              <a:rPr lang="en-US" dirty="0" err="1"/>
+              <a:t>luchtdruk</a:t>
+            </a:r>
+            <a:r>
+              <a:rPr lang="en-US" dirty="0"/>
+              <a:t>.</a:t>
+            </a:r>
           </a:p>
         </p:txBody>
       </p:sp>
@@ -1023,7 +1082,7 @@
     </p:spTree>
     <p:extLst>
       <p:ext uri="{BB962C8B-B14F-4D97-AF65-F5344CB8AC3E}">
-        <p14:creationId xmlns:p14="http://schemas.microsoft.com/office/powerpoint/2010/main" val="4294314713"/>
+        <p14:creationId xmlns:p14="http://schemas.microsoft.com/office/powerpoint/2010/main" val="2763382228"/>
       </p:ext>
     </p:extLst>
   </p:cSld>
@@ -1077,10 +1136,7 @@
           <a:bodyPr/>
           <a:lstStyle/>
           <a:p>
-            <a:r>
-              <a:rPr lang="en-US" dirty="0"/>
-              <a:t>Very long tails, not normal</a:t>
-            </a:r>
+            <a:endParaRPr lang="en-US" dirty="0"/>
           </a:p>
         </p:txBody>
       </p:sp>
@@ -1110,7 +1166,7 @@
     </p:spTree>
     <p:extLst>
       <p:ext uri="{BB962C8B-B14F-4D97-AF65-F5344CB8AC3E}">
-        <p14:creationId xmlns:p14="http://schemas.microsoft.com/office/powerpoint/2010/main" val="1847449081"/>
+        <p14:creationId xmlns:p14="http://schemas.microsoft.com/office/powerpoint/2010/main" val="4294314713"/>
       </p:ext>
     </p:extLst>
   </p:cSld>
@@ -1165,6 +1221,93 @@
           <a:lstStyle/>
           <a:p>
             <a:r>
+              <a:rPr lang="en-US" dirty="0"/>
+              <a:t>Very long tails, not normal</a:t>
+            </a:r>
+          </a:p>
+        </p:txBody>
+      </p:sp>
+      <p:sp>
+        <p:nvSpPr>
+          <p:cNvPr id="4" name="Slide Number Placeholder 3"/>
+          <p:cNvSpPr>
+            <a:spLocks noGrp="1"/>
+          </p:cNvSpPr>
+          <p:nvPr>
+            <p:ph type="sldNum" sz="quarter" idx="5"/>
+          </p:nvPr>
+        </p:nvSpPr>
+        <p:spPr/>
+        <p:txBody>
+          <a:bodyPr/>
+          <a:lstStyle/>
+          <a:p>
+            <a:fld id="{CDFDF6FA-C9C5-403D-8A8F-838FF3722E4D}" type="slidenum">
+              <a:rPr lang="en-US" smtClean="0"/>
+              <a:t>23</a:t>
+            </a:fld>
+            <a:endParaRPr lang="en-US"/>
+          </a:p>
+        </p:txBody>
+      </p:sp>
+    </p:spTree>
+    <p:extLst>
+      <p:ext uri="{BB962C8B-B14F-4D97-AF65-F5344CB8AC3E}">
+        <p14:creationId xmlns:p14="http://schemas.microsoft.com/office/powerpoint/2010/main" val="1847449081"/>
+      </p:ext>
+    </p:extLst>
+  </p:cSld>
+  <p:clrMapOvr>
+    <a:masterClrMapping/>
+  </p:clrMapOvr>
+</p:notes>
+</file>
+
+<file path=ppt/notesSlides/notesSlide6.xml><?xml version="1.0" encoding="utf-8"?>
+<p:notes xmlns:a="http://schemas.openxmlformats.org/drawingml/2006/main" xmlns:r="http://schemas.openxmlformats.org/officeDocument/2006/relationships" xmlns:p="http://schemas.openxmlformats.org/presentationml/2006/main">
+  <p:cSld>
+    <p:spTree>
+      <p:nvGrpSpPr>
+        <p:cNvPr id="1" name=""/>
+        <p:cNvGrpSpPr/>
+        <p:nvPr/>
+      </p:nvGrpSpPr>
+      <p:grpSpPr>
+        <a:xfrm>
+          <a:off x="0" y="0"/>
+          <a:ext cx="0" cy="0"/>
+          <a:chOff x="0" y="0"/>
+          <a:chExt cx="0" cy="0"/>
+        </a:xfrm>
+      </p:grpSpPr>
+      <p:sp>
+        <p:nvSpPr>
+          <p:cNvPr id="2" name="Slide Image Placeholder 1"/>
+          <p:cNvSpPr>
+            <a:spLocks noGrp="1" noRot="1" noChangeAspect="1"/>
+          </p:cNvSpPr>
+          <p:nvPr>
+            <p:ph type="sldImg"/>
+          </p:nvPr>
+        </p:nvSpPr>
+        <p:spPr/>
+      </p:sp>
+      <p:sp>
+        <p:nvSpPr>
+          <p:cNvPr id="3" name="Notes Placeholder 2"/>
+          <p:cNvSpPr>
+            <a:spLocks noGrp="1"/>
+          </p:cNvSpPr>
+          <p:nvPr>
+            <p:ph type="body" idx="1"/>
+          </p:nvPr>
+        </p:nvSpPr>
+        <p:spPr/>
+        <p:txBody>
+          <a:bodyPr/>
+          <a:lstStyle/>
+          <a:p>
+            <a:r>
               <a:rPr lang="en-US" dirty="0" err="1"/>
               <a:t>Misschien</a:t>
             </a:r>
@@ -1264,7 +1407,7 @@
           <a:p>
             <a:fld id="{CDFDF6FA-C9C5-403D-8A8F-838FF3722E4D}" type="slidenum">
               <a:rPr lang="en-US" smtClean="0"/>
-              <a:t>24</a:t>
+              <a:t>25</a:t>
             </a:fld>
             <a:endParaRPr lang="en-US"/>
           </a:p>
@@ -1432,7 +1575,7 @@
           <a:p>
             <a:fld id="{1F62A362-03E1-4775-BA67-CBC001C763DD}" type="datetimeFigureOut">
               <a:rPr lang="nl-BE" smtClean="0"/>
-              <a:t>28/05/2019</a:t>
+              <a:t>2/06/2019</a:t>
             </a:fld>
             <a:endParaRPr lang="nl-BE"/>
           </a:p>
@@ -1632,7 +1775,7 @@
           <a:p>
             <a:fld id="{1F62A362-03E1-4775-BA67-CBC001C763DD}" type="datetimeFigureOut">
               <a:rPr lang="nl-BE" smtClean="0"/>
-              <a:t>28/05/2019</a:t>
+              <a:t>2/06/2019</a:t>
             </a:fld>
             <a:endParaRPr lang="nl-BE"/>
           </a:p>
@@ -1842,7 +1985,7 @@
           <a:p>
             <a:fld id="{1F62A362-03E1-4775-BA67-CBC001C763DD}" type="datetimeFigureOut">
               <a:rPr lang="nl-BE" smtClean="0"/>
-              <a:t>28/05/2019</a:t>
+              <a:t>2/06/2019</a:t>
             </a:fld>
             <a:endParaRPr lang="nl-BE"/>
           </a:p>
@@ -2042,7 +2185,7 @@
           <a:p>
             <a:fld id="{1F62A362-03E1-4775-BA67-CBC001C763DD}" type="datetimeFigureOut">
               <a:rPr lang="nl-BE" smtClean="0"/>
-              <a:t>28/05/2019</a:t>
+              <a:t>2/06/2019</a:t>
             </a:fld>
             <a:endParaRPr lang="nl-BE"/>
           </a:p>
@@ -2318,7 +2461,7 @@
           <a:p>
             <a:fld id="{1F62A362-03E1-4775-BA67-CBC001C763DD}" type="datetimeFigureOut">
               <a:rPr lang="nl-BE" smtClean="0"/>
-              <a:t>28/05/2019</a:t>
+              <a:t>2/06/2019</a:t>
             </a:fld>
             <a:endParaRPr lang="nl-BE"/>
           </a:p>
@@ -2586,7 +2729,7 @@
           <a:p>
             <a:fld id="{1F62A362-03E1-4775-BA67-CBC001C763DD}" type="datetimeFigureOut">
               <a:rPr lang="nl-BE" smtClean="0"/>
-              <a:t>28/05/2019</a:t>
+              <a:t>2/06/2019</a:t>
             </a:fld>
             <a:endParaRPr lang="nl-BE"/>
           </a:p>
@@ -3001,7 +3144,7 @@
           <a:p>
             <a:fld id="{1F62A362-03E1-4775-BA67-CBC001C763DD}" type="datetimeFigureOut">
               <a:rPr lang="nl-BE" smtClean="0"/>
-              <a:t>28/05/2019</a:t>
+              <a:t>2/06/2019</a:t>
             </a:fld>
             <a:endParaRPr lang="nl-BE"/>
           </a:p>
@@ -3143,7 +3286,7 @@
           <a:p>
             <a:fld id="{1F62A362-03E1-4775-BA67-CBC001C763DD}" type="datetimeFigureOut">
               <a:rPr lang="nl-BE" smtClean="0"/>
-              <a:t>28/05/2019</a:t>
+              <a:t>2/06/2019</a:t>
             </a:fld>
             <a:endParaRPr lang="nl-BE"/>
           </a:p>
@@ -3256,7 +3399,7 @@
           <a:p>
             <a:fld id="{1F62A362-03E1-4775-BA67-CBC001C763DD}" type="datetimeFigureOut">
               <a:rPr lang="nl-BE" smtClean="0"/>
-              <a:t>28/05/2019</a:t>
+              <a:t>2/06/2019</a:t>
             </a:fld>
             <a:endParaRPr lang="nl-BE"/>
           </a:p>
@@ -3569,7 +3712,7 @@
           <a:p>
             <a:fld id="{1F62A362-03E1-4775-BA67-CBC001C763DD}" type="datetimeFigureOut">
               <a:rPr lang="nl-BE" smtClean="0"/>
-              <a:t>28/05/2019</a:t>
+              <a:t>2/06/2019</a:t>
             </a:fld>
             <a:endParaRPr lang="nl-BE"/>
           </a:p>
@@ -3858,7 +4001,7 @@
           <a:p>
             <a:fld id="{1F62A362-03E1-4775-BA67-CBC001C763DD}" type="datetimeFigureOut">
               <a:rPr lang="nl-BE" smtClean="0"/>
-              <a:t>28/05/2019</a:t>
+              <a:t>2/06/2019</a:t>
             </a:fld>
             <a:endParaRPr lang="nl-BE"/>
           </a:p>
@@ -4101,7 +4244,7 @@
           <a:p>
             <a:fld id="{1F62A362-03E1-4775-BA67-CBC001C763DD}" type="datetimeFigureOut">
               <a:rPr lang="nl-BE" smtClean="0"/>
-              <a:t>28/05/2019</a:t>
+              <a:t>2/06/2019</a:t>
             </a:fld>
             <a:endParaRPr lang="nl-BE"/>
           </a:p>
@@ -4684,6 +4827,143 @@
       </p:sp>
       <p:pic>
         <p:nvPicPr>
+          <p:cNvPr id="5" name="Picture 4">
+            <a:extLst>
+              <a:ext uri="{FF2B5EF4-FFF2-40B4-BE49-F238E27FC236}">
+                <a16:creationId xmlns:a16="http://schemas.microsoft.com/office/drawing/2014/main" id="{3E1F0056-CB14-41C4-8E1B-2717D99E04BA}"/>
+              </a:ext>
+            </a:extLst>
+          </p:cNvPr>
+          <p:cNvPicPr>
+            <a:picLocks noChangeAspect="1"/>
+          </p:cNvPicPr>
+          <p:nvPr/>
+        </p:nvPicPr>
+        <p:blipFill>
+          <a:blip r:embed="rId3"/>
+          <a:stretch>
+            <a:fillRect/>
+          </a:stretch>
+        </p:blipFill>
+        <p:spPr>
+          <a:xfrm>
+            <a:off x="2136000" y="2531485"/>
+            <a:ext cx="7920000" cy="3961390"/>
+          </a:xfrm>
+          <a:prstGeom prst="rect">
+            <a:avLst/>
+          </a:prstGeom>
+        </p:spPr>
+      </p:pic>
+    </p:spTree>
+    <p:extLst>
+      <p:ext uri="{BB962C8B-B14F-4D97-AF65-F5344CB8AC3E}">
+        <p14:creationId xmlns:p14="http://schemas.microsoft.com/office/powerpoint/2010/main" val="3977042041"/>
+      </p:ext>
+    </p:extLst>
+  </p:cSld>
+  <p:clrMapOvr>
+    <a:masterClrMapping/>
+  </p:clrMapOvr>
+</p:sld>
+</file>
+
+<file path=ppt/slides/slide11.xml><?xml version="1.0" encoding="utf-8"?>
+<p:sld xmlns:a="http://schemas.openxmlformats.org/drawingml/2006/main" xmlns:r="http://schemas.openxmlformats.org/officeDocument/2006/relationships" xmlns:p="http://schemas.openxmlformats.org/presentationml/2006/main">
+  <p:cSld>
+    <p:spTree>
+      <p:nvGrpSpPr>
+        <p:cNvPr id="1" name=""/>
+        <p:cNvGrpSpPr/>
+        <p:nvPr/>
+      </p:nvGrpSpPr>
+      <p:grpSpPr>
+        <a:xfrm>
+          <a:off x="0" y="0"/>
+          <a:ext cx="0" cy="0"/>
+          <a:chOff x="0" y="0"/>
+          <a:chExt cx="0" cy="0"/>
+        </a:xfrm>
+      </p:grpSpPr>
+      <p:sp>
+        <p:nvSpPr>
+          <p:cNvPr id="2" name="Title 1">
+            <a:extLst>
+              <a:ext uri="{FF2B5EF4-FFF2-40B4-BE49-F238E27FC236}">
+                <a16:creationId xmlns:a16="http://schemas.microsoft.com/office/drawing/2014/main" id="{6D80A9A5-3296-40DF-AB8B-E1B2FFA1A316}"/>
+              </a:ext>
+            </a:extLst>
+          </p:cNvPr>
+          <p:cNvSpPr>
+            <a:spLocks noGrp="1"/>
+          </p:cNvSpPr>
+          <p:nvPr>
+            <p:ph type="title"/>
+          </p:nvPr>
+        </p:nvSpPr>
+        <p:spPr>
+          <a:xfrm>
+            <a:off x="838200" y="365125"/>
+            <a:ext cx="10515600" cy="1325563"/>
+          </a:xfrm>
+        </p:spPr>
+        <p:txBody>
+          <a:bodyPr/>
+          <a:lstStyle/>
+          <a:p>
+            <a:r>
+              <a:rPr lang="nl-BE" dirty="0" err="1"/>
+              <a:t>Outliers</a:t>
+            </a:r>
+            <a:r>
+              <a:rPr lang="nl-BE" dirty="0"/>
+              <a:t>: v0.01</a:t>
+            </a:r>
+            <a:endParaRPr lang="en-US" dirty="0"/>
+          </a:p>
+        </p:txBody>
+      </p:sp>
+      <p:sp>
+        <p:nvSpPr>
+          <p:cNvPr id="3" name="Content Placeholder 2">
+            <a:extLst>
+              <a:ext uri="{FF2B5EF4-FFF2-40B4-BE49-F238E27FC236}">
+                <a16:creationId xmlns:a16="http://schemas.microsoft.com/office/drawing/2014/main" id="{B684F9E5-F86E-4C22-A298-BAF6033EAD66}"/>
+              </a:ext>
+            </a:extLst>
+          </p:cNvPr>
+          <p:cNvSpPr>
+            <a:spLocks noGrp="1"/>
+          </p:cNvSpPr>
+          <p:nvPr>
+            <p:ph idx="1"/>
+          </p:nvPr>
+        </p:nvSpPr>
+        <p:spPr>
+          <a:xfrm>
+            <a:off x="838200" y="1825625"/>
+            <a:ext cx="10515600" cy="4351338"/>
+          </a:xfrm>
+        </p:spPr>
+        <p:txBody>
+          <a:bodyPr/>
+          <a:lstStyle/>
+          <a:p>
+            <a:r>
+              <a:rPr lang="en-US">
+                <a:hlinkClick r:id="rId2"/>
+              </a:rPr>
+              <a:t>Validation</a:t>
+            </a:r>
+            <a:endParaRPr lang="en-US"/>
+          </a:p>
+          <a:p>
+            <a:endParaRPr lang="en-US" dirty="0"/>
+          </a:p>
+        </p:txBody>
+      </p:sp>
+      <p:pic>
+        <p:nvPicPr>
           <p:cNvPr id="4" name="Picture 3">
             <a:extLst>
               <a:ext uri="{FF2B5EF4-FFF2-40B4-BE49-F238E27FC236}">
@@ -4725,7 +5005,7 @@
 </p:sld>
 </file>
 
-<file path=ppt/slides/slide11.xml><?xml version="1.0" encoding="utf-8"?>
+<file path=ppt/slides/slide12.xml><?xml version="1.0" encoding="utf-8"?>
 <p:sld xmlns:a="http://schemas.openxmlformats.org/drawingml/2006/main" xmlns:r="http://schemas.openxmlformats.org/officeDocument/2006/relationships" xmlns:p="http://schemas.openxmlformats.org/presentationml/2006/main">
   <p:cSld>
     <p:spTree>
@@ -4862,7 +5142,7 @@
 </p:sld>
 </file>
 
-<file path=ppt/slides/slide12.xml><?xml version="1.0" encoding="utf-8"?>
+<file path=ppt/slides/slide13.xml><?xml version="1.0" encoding="utf-8"?>
 <p:sld xmlns:a="http://schemas.openxmlformats.org/drawingml/2006/main" xmlns:r="http://schemas.openxmlformats.org/officeDocument/2006/relationships" xmlns:p="http://schemas.openxmlformats.org/presentationml/2006/main">
   <p:cSld>
     <p:spTree>
@@ -5051,7 +5331,7 @@
 </p:sld>
 </file>
 
-<file path=ppt/slides/slide13.xml><?xml version="1.0" encoding="utf-8"?>
+<file path=ppt/slides/slide14.xml><?xml version="1.0" encoding="utf-8"?>
 <p:sld xmlns:a="http://schemas.openxmlformats.org/drawingml/2006/main" xmlns:r="http://schemas.openxmlformats.org/officeDocument/2006/relationships" xmlns:p="http://schemas.openxmlformats.org/presentationml/2006/main">
   <p:cSld>
     <p:spTree>
@@ -5150,7 +5430,7 @@
 </p:sld>
 </file>
 
-<file path=ppt/slides/slide14.xml><?xml version="1.0" encoding="utf-8"?>
+<file path=ppt/slides/slide15.xml><?xml version="1.0" encoding="utf-8"?>
 <p:sld xmlns:a="http://schemas.openxmlformats.org/drawingml/2006/main" xmlns:r="http://schemas.openxmlformats.org/officeDocument/2006/relationships" xmlns:p="http://schemas.openxmlformats.org/presentationml/2006/main">
   <p:cSld>
     <p:spTree>
@@ -5317,7 +5597,7 @@
 </p:sld>
 </file>
 
-<file path=ppt/slides/slide15.xml><?xml version="1.0" encoding="utf-8"?>
+<file path=ppt/slides/slide16.xml><?xml version="1.0" encoding="utf-8"?>
 <p:sld xmlns:a="http://schemas.openxmlformats.org/drawingml/2006/main" xmlns:r="http://schemas.openxmlformats.org/officeDocument/2006/relationships" xmlns:p="http://schemas.openxmlformats.org/presentationml/2006/main">
   <p:cSld>
     <p:spTree>
@@ -5454,7 +5734,7 @@
 </p:sld>
 </file>
 
-<file path=ppt/slides/slide16.xml><?xml version="1.0" encoding="utf-8"?>
+<file path=ppt/slides/slide17.xml><?xml version="1.0" encoding="utf-8"?>
 <p:sld xmlns:a="http://schemas.openxmlformats.org/drawingml/2006/main" xmlns:r="http://schemas.openxmlformats.org/officeDocument/2006/relationships" xmlns:p="http://schemas.openxmlformats.org/presentationml/2006/main">
   <p:cSld>
     <p:spTree>
@@ -5591,7 +5871,7 @@
 </p:sld>
 </file>
 
-<file path=ppt/slides/slide17.xml><?xml version="1.0" encoding="utf-8"?>
+<file path=ppt/slides/slide18.xml><?xml version="1.0" encoding="utf-8"?>
 <p:sld xmlns:a="http://schemas.openxmlformats.org/drawingml/2006/main" xmlns:r="http://schemas.openxmlformats.org/officeDocument/2006/relationships" xmlns:p="http://schemas.openxmlformats.org/presentationml/2006/main">
   <p:cSld>
     <p:spTree>
@@ -5728,201 +6008,6 @@
 </p:sld>
 </file>
 
-<file path=ppt/slides/slide18.xml><?xml version="1.0" encoding="utf-8"?>
-<p:sld xmlns:a="http://schemas.openxmlformats.org/drawingml/2006/main" xmlns:r="http://schemas.openxmlformats.org/officeDocument/2006/relationships" xmlns:p="http://schemas.openxmlformats.org/presentationml/2006/main">
-  <p:cSld>
-    <p:spTree>
-      <p:nvGrpSpPr>
-        <p:cNvPr id="1" name=""/>
-        <p:cNvGrpSpPr/>
-        <p:nvPr/>
-      </p:nvGrpSpPr>
-      <p:grpSpPr>
-        <a:xfrm>
-          <a:off x="0" y="0"/>
-          <a:ext cx="0" cy="0"/>
-          <a:chOff x="0" y="0"/>
-          <a:chExt cx="0" cy="0"/>
-        </a:xfrm>
-      </p:grpSpPr>
-      <p:sp>
-        <p:nvSpPr>
-          <p:cNvPr id="2" name="Title 1">
-            <a:extLst>
-              <a:ext uri="{FF2B5EF4-FFF2-40B4-BE49-F238E27FC236}">
-                <a16:creationId xmlns:a16="http://schemas.microsoft.com/office/drawing/2014/main" id="{7EF6E615-E1ED-4A41-A605-101A96BD0C57}"/>
-              </a:ext>
-            </a:extLst>
-          </p:cNvPr>
-          <p:cNvSpPr>
-            <a:spLocks noGrp="1"/>
-          </p:cNvSpPr>
-          <p:nvPr>
-            <p:ph type="title"/>
-          </p:nvPr>
-        </p:nvSpPr>
-        <p:spPr/>
-        <p:txBody>
-          <a:bodyPr/>
-          <a:lstStyle/>
-          <a:p>
-            <a:r>
-              <a:rPr lang="nl-BE" dirty="0"/>
-              <a:t>Summary</a:t>
-            </a:r>
-          </a:p>
-        </p:txBody>
-      </p:sp>
-      <p:sp>
-        <p:nvSpPr>
-          <p:cNvPr id="3" name="Content Placeholder 2">
-            <a:extLst>
-              <a:ext uri="{FF2B5EF4-FFF2-40B4-BE49-F238E27FC236}">
-                <a16:creationId xmlns:a16="http://schemas.microsoft.com/office/drawing/2014/main" id="{94FE688A-EFC1-4B6A-B366-8892B2C9EE1B}"/>
-              </a:ext>
-            </a:extLst>
-          </p:cNvPr>
-          <p:cNvSpPr>
-            <a:spLocks noGrp="1"/>
-          </p:cNvSpPr>
-          <p:nvPr>
-            <p:ph idx="1"/>
-          </p:nvPr>
-        </p:nvSpPr>
-        <p:spPr/>
-        <p:txBody>
-          <a:bodyPr>
-            <a:normAutofit lnSpcReduction="10000"/>
-          </a:bodyPr>
-          <a:lstStyle/>
-          <a:p>
-            <a:r>
-              <a:rPr lang="nl-BE" dirty="0" err="1"/>
-              <a:t>Outliers</a:t>
-            </a:r>
-            <a:r>
-              <a:rPr lang="nl-BE" dirty="0"/>
-              <a:t>: v0.01</a:t>
-            </a:r>
-          </a:p>
-          <a:p>
-            <a:pPr lvl="1"/>
-            <a:r>
-              <a:rPr lang="en-US" i="1" dirty="0" err="1"/>
-              <a:t>detect_outliers</a:t>
-            </a:r>
-            <a:r>
-              <a:rPr lang="en-US" i="1" dirty="0"/>
-              <a:t>(data)</a:t>
-            </a:r>
-          </a:p>
-          <a:p>
-            <a:pPr lvl="1"/>
-            <a:r>
-              <a:rPr lang="en-US" dirty="0"/>
-              <a:t>Usable on any data (not only L - </a:t>
-            </a:r>
-            <a:r>
-              <a:rPr lang="en-US" dirty="0" err="1"/>
-              <a:t>lucht</a:t>
-            </a:r>
-            <a:r>
-              <a:rPr lang="en-US" dirty="0"/>
-              <a:t>)</a:t>
-            </a:r>
-          </a:p>
-          <a:p>
-            <a:pPr lvl="1"/>
-            <a:r>
-              <a:rPr lang="en-US" dirty="0"/>
-              <a:t>Scale can be completely wrong (cf. BAOL018X_42112)</a:t>
-            </a:r>
-          </a:p>
-          <a:p>
-            <a:pPr lvl="1"/>
-            <a:endParaRPr lang="en-US" dirty="0"/>
-          </a:p>
-          <a:p>
-            <a:r>
-              <a:rPr lang="nl-BE" dirty="0" err="1"/>
-              <a:t>Outliers</a:t>
-            </a:r>
-            <a:r>
-              <a:rPr lang="nl-BE" dirty="0"/>
-              <a:t>: v0.02:</a:t>
-            </a:r>
-          </a:p>
-          <a:p>
-            <a:pPr lvl="1"/>
-            <a:r>
-              <a:rPr lang="en-US" i="1" dirty="0" err="1"/>
-              <a:t>detect_outliers</a:t>
-            </a:r>
-            <a:r>
-              <a:rPr lang="en-US" i="1" dirty="0"/>
-              <a:t>(data, type = c(“air pressure”, “air temperature”), units)</a:t>
-            </a:r>
-          </a:p>
-          <a:p>
-            <a:pPr lvl="1"/>
-            <a:r>
-              <a:rPr lang="en-US" dirty="0"/>
-              <a:t>Needs a-priori information</a:t>
-            </a:r>
-          </a:p>
-          <a:p>
-            <a:pPr lvl="2"/>
-            <a:r>
-              <a:rPr lang="en-US" dirty="0"/>
-              <a:t>Type</a:t>
-            </a:r>
-          </a:p>
-          <a:p>
-            <a:pPr lvl="2"/>
-            <a:r>
-              <a:rPr lang="en-US" dirty="0"/>
-              <a:t>Units</a:t>
-            </a:r>
-          </a:p>
-          <a:p>
-            <a:pPr lvl="1"/>
-            <a:r>
-              <a:rPr lang="en-US" b="1" dirty="0"/>
-              <a:t>Fixed or dynamic thresholds?</a:t>
-            </a:r>
-          </a:p>
-          <a:p>
-            <a:pPr lvl="2"/>
-            <a:endParaRPr lang="en-US" dirty="0"/>
-          </a:p>
-          <a:p>
-            <a:pPr lvl="2"/>
-            <a:endParaRPr lang="en-US" dirty="0"/>
-          </a:p>
-          <a:p>
-            <a:endParaRPr lang="en-US" dirty="0"/>
-          </a:p>
-          <a:p>
-            <a:endParaRPr lang="en-US" dirty="0"/>
-          </a:p>
-          <a:p>
-            <a:endParaRPr lang="en-US" dirty="0"/>
-          </a:p>
-        </p:txBody>
-      </p:sp>
-    </p:spTree>
-    <p:extLst>
-      <p:ext uri="{BB962C8B-B14F-4D97-AF65-F5344CB8AC3E}">
-        <p14:creationId xmlns:p14="http://schemas.microsoft.com/office/powerpoint/2010/main" val="680053974"/>
-      </p:ext>
-    </p:extLst>
-  </p:cSld>
-  <p:clrMapOvr>
-    <a:masterClrMapping/>
-  </p:clrMapOvr>
-</p:sld>
-</file>
-
 <file path=ppt/slides/slide19.xml><?xml version="1.0" encoding="utf-8"?>
 <p:sld xmlns:a="http://schemas.openxmlformats.org/drawingml/2006/main" xmlns:r="http://schemas.openxmlformats.org/officeDocument/2006/relationships" xmlns:p="http://schemas.openxmlformats.org/presentationml/2006/main">
   <p:cSld>
@@ -5942,10 +6027,10 @@
       </p:grpSpPr>
       <p:sp>
         <p:nvSpPr>
-          <p:cNvPr id="4" name="Title 3">
-            <a:extLst>
-              <a:ext uri="{FF2B5EF4-FFF2-40B4-BE49-F238E27FC236}">
-                <a16:creationId xmlns:a16="http://schemas.microsoft.com/office/drawing/2014/main" id="{0ABA15CC-0341-43E7-90FB-0A22D5CFC77D}"/>
+          <p:cNvPr id="2" name="Title 1">
+            <a:extLst>
+              <a:ext uri="{FF2B5EF4-FFF2-40B4-BE49-F238E27FC236}">
+                <a16:creationId xmlns:a16="http://schemas.microsoft.com/office/drawing/2014/main" id="{7EF6E615-E1ED-4A41-A605-101A96BD0C57}"/>
               </a:ext>
             </a:extLst>
           </p:cNvPr>
@@ -5959,6 +6044,36 @@
         <p:spPr/>
         <p:txBody>
           <a:bodyPr/>
+          <a:lstStyle/>
+          <a:p>
+            <a:r>
+              <a:rPr lang="nl-BE" dirty="0"/>
+              <a:t>Summary</a:t>
+            </a:r>
+          </a:p>
+        </p:txBody>
+      </p:sp>
+      <p:sp>
+        <p:nvSpPr>
+          <p:cNvPr id="3" name="Content Placeholder 2">
+            <a:extLst>
+              <a:ext uri="{FF2B5EF4-FFF2-40B4-BE49-F238E27FC236}">
+                <a16:creationId xmlns:a16="http://schemas.microsoft.com/office/drawing/2014/main" id="{94FE688A-EFC1-4B6A-B366-8892B2C9EE1B}"/>
+              </a:ext>
+            </a:extLst>
+          </p:cNvPr>
+          <p:cNvSpPr>
+            <a:spLocks noGrp="1"/>
+          </p:cNvSpPr>
+          <p:nvPr>
+            <p:ph idx="1"/>
+          </p:nvPr>
+        </p:nvSpPr>
+        <p:spPr/>
+        <p:txBody>
+          <a:bodyPr>
+            <a:normAutofit lnSpcReduction="10000"/>
+          </a:bodyPr>
           <a:lstStyle/>
           <a:p>
             <a:r>
@@ -5967,44 +6082,118 @@
             </a:r>
             <a:r>
               <a:rPr lang="nl-BE" dirty="0"/>
-              <a:t>: v0.03</a:t>
-            </a:r>
+              <a:t>: v0.01</a:t>
+            </a:r>
+          </a:p>
+          <a:p>
+            <a:pPr lvl="1"/>
+            <a:r>
+              <a:rPr lang="en-US" i="1" dirty="0" err="1"/>
+              <a:t>detect_outliers</a:t>
+            </a:r>
+            <a:r>
+              <a:rPr lang="en-US" i="1" dirty="0"/>
+              <a:t>(data)</a:t>
+            </a:r>
+          </a:p>
+          <a:p>
+            <a:pPr lvl="1"/>
+            <a:r>
+              <a:rPr lang="en-US" dirty="0"/>
+              <a:t>Usable on any data (not only L - </a:t>
+            </a:r>
+            <a:r>
+              <a:rPr lang="en-US" dirty="0" err="1"/>
+              <a:t>lucht</a:t>
+            </a:r>
+            <a:r>
+              <a:rPr lang="en-US" dirty="0"/>
+              <a:t>)</a:t>
+            </a:r>
+          </a:p>
+          <a:p>
+            <a:pPr lvl="1"/>
+            <a:r>
+              <a:rPr lang="en-US" dirty="0"/>
+              <a:t>Scale can be completely wrong (cf. BAOL018X_42112)</a:t>
+            </a:r>
+          </a:p>
+          <a:p>
+            <a:pPr lvl="1"/>
             <a:endParaRPr lang="en-US" dirty="0"/>
           </a:p>
-        </p:txBody>
-      </p:sp>
-      <p:sp>
-        <p:nvSpPr>
-          <p:cNvPr id="5" name="Text Placeholder 4">
-            <a:extLst>
-              <a:ext uri="{FF2B5EF4-FFF2-40B4-BE49-F238E27FC236}">
-                <a16:creationId xmlns:a16="http://schemas.microsoft.com/office/drawing/2014/main" id="{CA528F7E-FCA6-4235-B85D-808106A53E05}"/>
-              </a:ext>
-            </a:extLst>
-          </p:cNvPr>
-          <p:cNvSpPr>
-            <a:spLocks noGrp="1"/>
-          </p:cNvSpPr>
-          <p:nvPr>
-            <p:ph type="body" idx="1"/>
-          </p:nvPr>
-        </p:nvSpPr>
-        <p:spPr/>
-        <p:txBody>
-          <a:bodyPr/>
-          <a:lstStyle/>
-          <a:p>
-            <a:r>
-              <a:rPr lang="en-US"/>
-              <a:t>Go even further with a-priori information?</a:t>
-            </a:r>
+          <a:p>
+            <a:r>
+              <a:rPr lang="nl-BE" dirty="0" err="1"/>
+              <a:t>Outliers</a:t>
+            </a:r>
+            <a:r>
+              <a:rPr lang="nl-BE" dirty="0"/>
+              <a:t>: v0.02:</a:t>
+            </a:r>
+          </a:p>
+          <a:p>
+            <a:pPr lvl="1"/>
+            <a:r>
+              <a:rPr lang="en-US" i="1" dirty="0" err="1"/>
+              <a:t>detect_outliers</a:t>
+            </a:r>
+            <a:r>
+              <a:rPr lang="en-US" i="1" dirty="0"/>
+              <a:t>(data, type = c(“air pressure”, “air temperature”), units)</a:t>
+            </a:r>
+          </a:p>
+          <a:p>
+            <a:pPr lvl="1"/>
+            <a:r>
+              <a:rPr lang="en-US" dirty="0"/>
+              <a:t>Needs a-priori information</a:t>
+            </a:r>
+          </a:p>
+          <a:p>
+            <a:pPr lvl="2"/>
+            <a:r>
+              <a:rPr lang="en-US" dirty="0"/>
+              <a:t>Type</a:t>
+            </a:r>
+          </a:p>
+          <a:p>
+            <a:pPr lvl="2"/>
+            <a:r>
+              <a:rPr lang="en-US" dirty="0"/>
+              <a:t>Units</a:t>
+            </a:r>
+          </a:p>
+          <a:p>
+            <a:pPr lvl="1"/>
+            <a:r>
+              <a:rPr lang="en-US" b="1" dirty="0"/>
+              <a:t>Fixed or dynamic thresholds?</a:t>
+            </a:r>
+          </a:p>
+          <a:p>
+            <a:pPr lvl="2"/>
+            <a:endParaRPr lang="en-US" dirty="0"/>
+          </a:p>
+          <a:p>
+            <a:pPr lvl="2"/>
+            <a:endParaRPr lang="en-US" dirty="0"/>
+          </a:p>
+          <a:p>
+            <a:endParaRPr lang="en-US" dirty="0"/>
+          </a:p>
+          <a:p>
+            <a:endParaRPr lang="en-US" dirty="0"/>
+          </a:p>
+          <a:p>
+            <a:endParaRPr lang="en-US" dirty="0"/>
           </a:p>
         </p:txBody>
       </p:sp>
     </p:spTree>
     <p:extLst>
       <p:ext uri="{BB962C8B-B14F-4D97-AF65-F5344CB8AC3E}">
-        <p14:creationId xmlns:p14="http://schemas.microsoft.com/office/powerpoint/2010/main" val="1086001545"/>
+        <p14:creationId xmlns:p14="http://schemas.microsoft.com/office/powerpoint/2010/main" val="680053974"/>
       </p:ext>
     </p:extLst>
   </p:cSld>
@@ -6036,46 +6225,23 @@
           <p:cNvPr id="2" name="Title 1">
             <a:extLst>
               <a:ext uri="{FF2B5EF4-FFF2-40B4-BE49-F238E27FC236}">
-                <a16:creationId xmlns:a16="http://schemas.microsoft.com/office/drawing/2014/main" id="{C381B617-432B-4260-807D-A33327190D4A}"/>
-              </a:ext>
-            </a:extLst>
-          </p:cNvPr>
-          <p:cNvSpPr>
-            <a:spLocks noGrp="1"/>
-          </p:cNvSpPr>
-          <p:nvPr>
-            <p:ph type="ctrTitle"/>
-          </p:nvPr>
-        </p:nvSpPr>
-        <p:spPr/>
-        <p:txBody>
-          <a:bodyPr/>
-          <a:lstStyle/>
-          <a:p>
-            <a:r>
-              <a:rPr lang="nl-BE" dirty="0"/>
-              <a:t>Sprint 1</a:t>
-            </a:r>
-          </a:p>
-        </p:txBody>
-      </p:sp>
-      <p:sp>
-        <p:nvSpPr>
-          <p:cNvPr id="3" name="Subtitle 2">
-            <a:extLst>
-              <a:ext uri="{FF2B5EF4-FFF2-40B4-BE49-F238E27FC236}">
-                <a16:creationId xmlns:a16="http://schemas.microsoft.com/office/drawing/2014/main" id="{16F05D79-76DB-438C-88CF-3FFFDCCE47AA}"/>
-              </a:ext>
-            </a:extLst>
-          </p:cNvPr>
-          <p:cNvSpPr>
-            <a:spLocks noGrp="1"/>
-          </p:cNvSpPr>
-          <p:nvPr>
-            <p:ph type="subTitle" idx="1"/>
-          </p:nvPr>
-        </p:nvSpPr>
-        <p:spPr/>
+                <a16:creationId xmlns:a16="http://schemas.microsoft.com/office/drawing/2014/main" id="{6D80A9A5-3296-40DF-AB8B-E1B2FFA1A316}"/>
+              </a:ext>
+            </a:extLst>
+          </p:cNvPr>
+          <p:cNvSpPr>
+            <a:spLocks noGrp="1"/>
+          </p:cNvSpPr>
+          <p:nvPr>
+            <p:ph type="title"/>
+          </p:nvPr>
+        </p:nvSpPr>
+        <p:spPr>
+          <a:xfrm>
+            <a:off x="838200" y="365125"/>
+            <a:ext cx="10515600" cy="1325563"/>
+          </a:xfrm>
+        </p:spPr>
         <p:txBody>
           <a:bodyPr/>
           <a:lstStyle/>
@@ -6084,14 +6250,121 @@
               <a:rPr lang="nl-BE" dirty="0" err="1"/>
               <a:t>Outliers</a:t>
             </a:r>
-            <a:endParaRPr lang="nl-BE" dirty="0"/>
-          </a:p>
-        </p:txBody>
-      </p:sp>
+            <a:r>
+              <a:rPr lang="nl-BE" dirty="0"/>
+              <a:t>: </a:t>
+            </a:r>
+            <a:r>
+              <a:rPr lang="nl-BE"/>
+              <a:t>v0.02 update</a:t>
+            </a:r>
+            <a:endParaRPr lang="en-US" dirty="0"/>
+          </a:p>
+        </p:txBody>
+      </p:sp>
+      <p:sp>
+        <p:nvSpPr>
+          <p:cNvPr id="3" name="Content Placeholder 2">
+            <a:extLst>
+              <a:ext uri="{FF2B5EF4-FFF2-40B4-BE49-F238E27FC236}">
+                <a16:creationId xmlns:a16="http://schemas.microsoft.com/office/drawing/2014/main" id="{B684F9E5-F86E-4C22-A298-BAF6033EAD66}"/>
+              </a:ext>
+            </a:extLst>
+          </p:cNvPr>
+          <p:cNvSpPr>
+            <a:spLocks noGrp="1"/>
+          </p:cNvSpPr>
+          <p:nvPr>
+            <p:ph idx="1"/>
+          </p:nvPr>
+        </p:nvSpPr>
+        <p:spPr>
+          <a:xfrm>
+            <a:off x="838200" y="1825625"/>
+            <a:ext cx="10515600" cy="4351338"/>
+          </a:xfrm>
+        </p:spPr>
+        <p:txBody>
+          <a:bodyPr/>
+          <a:lstStyle/>
+          <a:p>
+            <a:r>
+              <a:rPr lang="en-US" dirty="0">
+                <a:hlinkClick r:id="rId3"/>
+              </a:rPr>
+              <a:t>Validation</a:t>
+            </a:r>
+            <a:endParaRPr lang="en-US" dirty="0"/>
+          </a:p>
+          <a:p>
+            <a:endParaRPr lang="en-US" dirty="0"/>
+          </a:p>
+        </p:txBody>
+      </p:sp>
+      <p:pic>
+        <p:nvPicPr>
+          <p:cNvPr id="4" name="Picture 3">
+            <a:extLst>
+              <a:ext uri="{FF2B5EF4-FFF2-40B4-BE49-F238E27FC236}">
+                <a16:creationId xmlns:a16="http://schemas.microsoft.com/office/drawing/2014/main" id="{96C7B94B-AD3E-4E53-8A09-B79A3EF4E2AA}"/>
+              </a:ext>
+            </a:extLst>
+          </p:cNvPr>
+          <p:cNvPicPr>
+            <a:picLocks noChangeAspect="1"/>
+          </p:cNvPicPr>
+          <p:nvPr/>
+        </p:nvPicPr>
+        <p:blipFill>
+          <a:blip r:embed="rId4"/>
+          <a:stretch>
+            <a:fillRect/>
+          </a:stretch>
+        </p:blipFill>
+        <p:spPr>
+          <a:xfrm>
+            <a:off x="6542022" y="2436948"/>
+            <a:ext cx="5040000" cy="4421052"/>
+          </a:xfrm>
+          <a:prstGeom prst="rect">
+            <a:avLst/>
+          </a:prstGeom>
+        </p:spPr>
+      </p:pic>
+      <p:pic>
+        <p:nvPicPr>
+          <p:cNvPr id="7" name="Picture 6">
+            <a:extLst>
+              <a:ext uri="{FF2B5EF4-FFF2-40B4-BE49-F238E27FC236}">
+                <a16:creationId xmlns:a16="http://schemas.microsoft.com/office/drawing/2014/main" id="{D5443115-89B2-43AE-8A8A-C41E2443C31F}"/>
+              </a:ext>
+            </a:extLst>
+          </p:cNvPr>
+          <p:cNvPicPr>
+            <a:picLocks noChangeAspect="1"/>
+          </p:cNvPicPr>
+          <p:nvPr/>
+        </p:nvPicPr>
+        <p:blipFill>
+          <a:blip r:embed="rId5"/>
+          <a:stretch>
+            <a:fillRect/>
+          </a:stretch>
+        </p:blipFill>
+        <p:spPr>
+          <a:xfrm>
+            <a:off x="1170111" y="2436948"/>
+            <a:ext cx="5040000" cy="4421052"/>
+          </a:xfrm>
+          <a:prstGeom prst="rect">
+            <a:avLst/>
+          </a:prstGeom>
+        </p:spPr>
+      </p:pic>
     </p:spTree>
     <p:extLst>
       <p:ext uri="{BB962C8B-B14F-4D97-AF65-F5344CB8AC3E}">
-        <p14:creationId xmlns:p14="http://schemas.microsoft.com/office/powerpoint/2010/main" val="2423986036"/>
+        <p14:creationId xmlns:p14="http://schemas.microsoft.com/office/powerpoint/2010/main" val="2196440616"/>
       </p:ext>
     </p:extLst>
   </p:cSld>
@@ -6102,6 +6375,97 @@
 </file>
 
 <file path=ppt/slides/slide20.xml><?xml version="1.0" encoding="utf-8"?>
+<p:sld xmlns:a="http://schemas.openxmlformats.org/drawingml/2006/main" xmlns:r="http://schemas.openxmlformats.org/officeDocument/2006/relationships" xmlns:p="http://schemas.openxmlformats.org/presentationml/2006/main">
+  <p:cSld>
+    <p:spTree>
+      <p:nvGrpSpPr>
+        <p:cNvPr id="1" name=""/>
+        <p:cNvGrpSpPr/>
+        <p:nvPr/>
+      </p:nvGrpSpPr>
+      <p:grpSpPr>
+        <a:xfrm>
+          <a:off x="0" y="0"/>
+          <a:ext cx="0" cy="0"/>
+          <a:chOff x="0" y="0"/>
+          <a:chExt cx="0" cy="0"/>
+        </a:xfrm>
+      </p:grpSpPr>
+      <p:sp>
+        <p:nvSpPr>
+          <p:cNvPr id="4" name="Title 3">
+            <a:extLst>
+              <a:ext uri="{FF2B5EF4-FFF2-40B4-BE49-F238E27FC236}">
+                <a16:creationId xmlns:a16="http://schemas.microsoft.com/office/drawing/2014/main" id="{0ABA15CC-0341-43E7-90FB-0A22D5CFC77D}"/>
+              </a:ext>
+            </a:extLst>
+          </p:cNvPr>
+          <p:cNvSpPr>
+            <a:spLocks noGrp="1"/>
+          </p:cNvSpPr>
+          <p:nvPr>
+            <p:ph type="title"/>
+          </p:nvPr>
+        </p:nvSpPr>
+        <p:spPr/>
+        <p:txBody>
+          <a:bodyPr/>
+          <a:lstStyle/>
+          <a:p>
+            <a:r>
+              <a:rPr lang="nl-BE" dirty="0" err="1"/>
+              <a:t>Outliers</a:t>
+            </a:r>
+            <a:r>
+              <a:rPr lang="nl-BE" dirty="0"/>
+              <a:t>: v0.03</a:t>
+            </a:r>
+            <a:endParaRPr lang="en-US" dirty="0"/>
+          </a:p>
+        </p:txBody>
+      </p:sp>
+      <p:sp>
+        <p:nvSpPr>
+          <p:cNvPr id="5" name="Text Placeholder 4">
+            <a:extLst>
+              <a:ext uri="{FF2B5EF4-FFF2-40B4-BE49-F238E27FC236}">
+                <a16:creationId xmlns:a16="http://schemas.microsoft.com/office/drawing/2014/main" id="{CA528F7E-FCA6-4235-B85D-808106A53E05}"/>
+              </a:ext>
+            </a:extLst>
+          </p:cNvPr>
+          <p:cNvSpPr>
+            <a:spLocks noGrp="1"/>
+          </p:cNvSpPr>
+          <p:nvPr>
+            <p:ph type="body" idx="1"/>
+          </p:nvPr>
+        </p:nvSpPr>
+        <p:spPr/>
+        <p:txBody>
+          <a:bodyPr/>
+          <a:lstStyle/>
+          <a:p>
+            <a:r>
+              <a:rPr lang="en-US"/>
+              <a:t>Go even further with a-priori information?</a:t>
+            </a:r>
+          </a:p>
+        </p:txBody>
+      </p:sp>
+    </p:spTree>
+    <p:extLst>
+      <p:ext uri="{BB962C8B-B14F-4D97-AF65-F5344CB8AC3E}">
+        <p14:creationId xmlns:p14="http://schemas.microsoft.com/office/powerpoint/2010/main" val="1086001545"/>
+      </p:ext>
+    </p:extLst>
+  </p:cSld>
+  <p:clrMapOvr>
+    <a:masterClrMapping/>
+  </p:clrMapOvr>
+</p:sld>
+</file>
+
+<file path=ppt/slides/slide21.xml><?xml version="1.0" encoding="utf-8"?>
 <p:sld xmlns:a="http://schemas.openxmlformats.org/drawingml/2006/main" xmlns:r="http://schemas.openxmlformats.org/officeDocument/2006/relationships" xmlns:p="http://schemas.openxmlformats.org/presentationml/2006/main">
   <p:cSld>
     <p:spTree>
@@ -6251,7 +6615,7 @@
 </p:sld>
 </file>
 
-<file path=ppt/slides/slide21.xml><?xml version="1.0" encoding="utf-8"?>
+<file path=ppt/slides/slide22.xml><?xml version="1.0" encoding="utf-8"?>
 <p:sld xmlns:a="http://schemas.openxmlformats.org/drawingml/2006/main" xmlns:r="http://schemas.openxmlformats.org/officeDocument/2006/relationships" xmlns:p="http://schemas.openxmlformats.org/presentationml/2006/main">
   <p:cSld>
     <p:spTree>
@@ -6300,8 +6664,8 @@
           </a:p>
         </p:txBody>
       </p:sp>
-      <mc:AlternateContent xmlns:mc="http://schemas.openxmlformats.org/markup-compatibility/2006">
-        <mc:Choice xmlns:a14="http://schemas.microsoft.com/office/drawing/2010/main" Requires="a14">
+      <mc:AlternateContent xmlns:mc="http://schemas.openxmlformats.org/markup-compatibility/2006" xmlns:a14="http://schemas.microsoft.com/office/drawing/2010/main">
+        <mc:Choice Requires="a14">
           <p:sp>
             <p:nvSpPr>
               <p:cNvPr id="3" name="Content Placeholder 2">
@@ -6537,7 +6901,7 @@
             </p:txBody>
           </p:sp>
         </mc:Choice>
-        <mc:Fallback>
+        <mc:Fallback xmlns="">
           <p:sp>
             <p:nvSpPr>
               <p:cNvPr id="3" name="Content Placeholder 2">
@@ -6590,7 +6954,7 @@
 </p:sld>
 </file>
 
-<file path=ppt/slides/slide22.xml><?xml version="1.0" encoding="utf-8"?>
+<file path=ppt/slides/slide23.xml><?xml version="1.0" encoding="utf-8"?>
 <p:sld xmlns:a="http://schemas.openxmlformats.org/drawingml/2006/main" xmlns:r="http://schemas.openxmlformats.org/officeDocument/2006/relationships" xmlns:p="http://schemas.openxmlformats.org/presentationml/2006/main">
   <p:cSld>
     <p:spTree>
@@ -6723,90 +7087,6 @@
 </p:sld>
 </file>
 
-<file path=ppt/slides/slide23.xml><?xml version="1.0" encoding="utf-8"?>
-<p:sld xmlns:a="http://schemas.openxmlformats.org/drawingml/2006/main" xmlns:r="http://schemas.openxmlformats.org/officeDocument/2006/relationships" xmlns:p="http://schemas.openxmlformats.org/presentationml/2006/main">
-  <p:cSld>
-    <p:spTree>
-      <p:nvGrpSpPr>
-        <p:cNvPr id="1" name=""/>
-        <p:cNvGrpSpPr/>
-        <p:nvPr/>
-      </p:nvGrpSpPr>
-      <p:grpSpPr>
-        <a:xfrm>
-          <a:off x="0" y="0"/>
-          <a:ext cx="0" cy="0"/>
-          <a:chOff x="0" y="0"/>
-          <a:chExt cx="0" cy="0"/>
-        </a:xfrm>
-      </p:grpSpPr>
-      <p:sp>
-        <p:nvSpPr>
-          <p:cNvPr id="4" name="Title 3">
-            <a:extLst>
-              <a:ext uri="{FF2B5EF4-FFF2-40B4-BE49-F238E27FC236}">
-                <a16:creationId xmlns:a16="http://schemas.microsoft.com/office/drawing/2014/main" id="{0ABA15CC-0341-43E7-90FB-0A22D5CFC77D}"/>
-              </a:ext>
-            </a:extLst>
-          </p:cNvPr>
-          <p:cNvSpPr>
-            <a:spLocks noGrp="1"/>
-          </p:cNvSpPr>
-          <p:nvPr>
-            <p:ph type="title"/>
-          </p:nvPr>
-        </p:nvSpPr>
-        <p:spPr/>
-        <p:txBody>
-          <a:bodyPr/>
-          <a:lstStyle/>
-          <a:p>
-            <a:r>
-              <a:rPr lang="nl-BE"/>
-              <a:t>Next steps</a:t>
-            </a:r>
-            <a:endParaRPr lang="en-US" dirty="0"/>
-          </a:p>
-        </p:txBody>
-      </p:sp>
-      <p:sp>
-        <p:nvSpPr>
-          <p:cNvPr id="5" name="Text Placeholder 4">
-            <a:extLst>
-              <a:ext uri="{FF2B5EF4-FFF2-40B4-BE49-F238E27FC236}">
-                <a16:creationId xmlns:a16="http://schemas.microsoft.com/office/drawing/2014/main" id="{CA528F7E-FCA6-4235-B85D-808106A53E05}"/>
-              </a:ext>
-            </a:extLst>
-          </p:cNvPr>
-          <p:cNvSpPr>
-            <a:spLocks noGrp="1"/>
-          </p:cNvSpPr>
-          <p:nvPr>
-            <p:ph type="body" idx="1"/>
-          </p:nvPr>
-        </p:nvSpPr>
-        <p:spPr/>
-        <p:txBody>
-          <a:bodyPr/>
-          <a:lstStyle/>
-          <a:p>
-            <a:endParaRPr lang="en-US" dirty="0"/>
-          </a:p>
-        </p:txBody>
-      </p:sp>
-    </p:spTree>
-    <p:extLst>
-      <p:ext uri="{BB962C8B-B14F-4D97-AF65-F5344CB8AC3E}">
-        <p14:creationId xmlns:p14="http://schemas.microsoft.com/office/powerpoint/2010/main" val="2971358645"/>
-      </p:ext>
-    </p:extLst>
-  </p:cSld>
-  <p:clrMapOvr>
-    <a:masterClrMapping/>
-  </p:clrMapOvr>
-</p:sld>
-</file>
-
 <file path=ppt/slides/slide24.xml><?xml version="1.0" encoding="utf-8"?>
 <p:sld xmlns:a="http://schemas.openxmlformats.org/drawingml/2006/main" xmlns:r="http://schemas.openxmlformats.org/officeDocument/2006/relationships" xmlns:p="http://schemas.openxmlformats.org/presentationml/2006/main">
   <p:cSld>
@@ -6829,6 +7109,90 @@
           <p:cNvPr id="4" name="Title 3">
             <a:extLst>
               <a:ext uri="{FF2B5EF4-FFF2-40B4-BE49-F238E27FC236}">
+                <a16:creationId xmlns:a16="http://schemas.microsoft.com/office/drawing/2014/main" id="{0ABA15CC-0341-43E7-90FB-0A22D5CFC77D}"/>
+              </a:ext>
+            </a:extLst>
+          </p:cNvPr>
+          <p:cNvSpPr>
+            <a:spLocks noGrp="1"/>
+          </p:cNvSpPr>
+          <p:nvPr>
+            <p:ph type="title"/>
+          </p:nvPr>
+        </p:nvSpPr>
+        <p:spPr/>
+        <p:txBody>
+          <a:bodyPr/>
+          <a:lstStyle/>
+          <a:p>
+            <a:r>
+              <a:rPr lang="nl-BE"/>
+              <a:t>Next steps</a:t>
+            </a:r>
+            <a:endParaRPr lang="en-US" dirty="0"/>
+          </a:p>
+        </p:txBody>
+      </p:sp>
+      <p:sp>
+        <p:nvSpPr>
+          <p:cNvPr id="5" name="Text Placeholder 4">
+            <a:extLst>
+              <a:ext uri="{FF2B5EF4-FFF2-40B4-BE49-F238E27FC236}">
+                <a16:creationId xmlns:a16="http://schemas.microsoft.com/office/drawing/2014/main" id="{CA528F7E-FCA6-4235-B85D-808106A53E05}"/>
+              </a:ext>
+            </a:extLst>
+          </p:cNvPr>
+          <p:cNvSpPr>
+            <a:spLocks noGrp="1"/>
+          </p:cNvSpPr>
+          <p:nvPr>
+            <p:ph type="body" idx="1"/>
+          </p:nvPr>
+        </p:nvSpPr>
+        <p:spPr/>
+        <p:txBody>
+          <a:bodyPr/>
+          <a:lstStyle/>
+          <a:p>
+            <a:endParaRPr lang="en-US" dirty="0"/>
+          </a:p>
+        </p:txBody>
+      </p:sp>
+    </p:spTree>
+    <p:extLst>
+      <p:ext uri="{BB962C8B-B14F-4D97-AF65-F5344CB8AC3E}">
+        <p14:creationId xmlns:p14="http://schemas.microsoft.com/office/powerpoint/2010/main" val="2971358645"/>
+      </p:ext>
+    </p:extLst>
+  </p:cSld>
+  <p:clrMapOvr>
+    <a:masterClrMapping/>
+  </p:clrMapOvr>
+</p:sld>
+</file>
+
+<file path=ppt/slides/slide25.xml><?xml version="1.0" encoding="utf-8"?>
+<p:sld xmlns:a="http://schemas.openxmlformats.org/drawingml/2006/main" xmlns:r="http://schemas.openxmlformats.org/officeDocument/2006/relationships" xmlns:p="http://schemas.openxmlformats.org/presentationml/2006/main">
+  <p:cSld>
+    <p:spTree>
+      <p:nvGrpSpPr>
+        <p:cNvPr id="1" name=""/>
+        <p:cNvGrpSpPr/>
+        <p:nvPr/>
+      </p:nvGrpSpPr>
+      <p:grpSpPr>
+        <a:xfrm>
+          <a:off x="0" y="0"/>
+          <a:ext cx="0" cy="0"/>
+          <a:chOff x="0" y="0"/>
+          <a:chExt cx="0" cy="0"/>
+        </a:xfrm>
+      </p:grpSpPr>
+      <p:sp>
+        <p:nvSpPr>
+          <p:cNvPr id="4" name="Title 3">
+            <a:extLst>
+              <a:ext uri="{FF2B5EF4-FFF2-40B4-BE49-F238E27FC236}">
                 <a16:creationId xmlns:a16="http://schemas.microsoft.com/office/drawing/2014/main" id="{082A28BB-5C5E-4AD7-8A49-2221ABD4C9A8}"/>
               </a:ext>
             </a:extLst>
@@ -6917,7 +7281,7 @@
 </p:sld>
 </file>
 
-<file path=ppt/slides/slide25.xml><?xml version="1.0" encoding="utf-8"?>
+<file path=ppt/slides/slide26.xml><?xml version="1.0" encoding="utf-8"?>
 <p:sld xmlns:a="http://schemas.openxmlformats.org/drawingml/2006/main" xmlns:r="http://schemas.openxmlformats.org/officeDocument/2006/relationships" xmlns:p="http://schemas.openxmlformats.org/presentationml/2006/main">
   <p:cSld>
     <p:spTree>
@@ -7023,15 +7387,43 @@
           <p:cNvPr id="2" name="Title 1">
             <a:extLst>
               <a:ext uri="{FF2B5EF4-FFF2-40B4-BE49-F238E27FC236}">
-                <a16:creationId xmlns:a16="http://schemas.microsoft.com/office/drawing/2014/main" id="{2AAF558A-3957-4364-84E1-918EECE4497A}"/>
-              </a:ext>
-            </a:extLst>
-          </p:cNvPr>
-          <p:cNvSpPr>
-            <a:spLocks noGrp="1"/>
-          </p:cNvSpPr>
-          <p:nvPr>
-            <p:ph type="title"/>
+                <a16:creationId xmlns:a16="http://schemas.microsoft.com/office/drawing/2014/main" id="{C381B617-432B-4260-807D-A33327190D4A}"/>
+              </a:ext>
+            </a:extLst>
+          </p:cNvPr>
+          <p:cNvSpPr>
+            <a:spLocks noGrp="1"/>
+          </p:cNvSpPr>
+          <p:nvPr>
+            <p:ph type="ctrTitle"/>
+          </p:nvPr>
+        </p:nvSpPr>
+        <p:spPr/>
+        <p:txBody>
+          <a:bodyPr/>
+          <a:lstStyle/>
+          <a:p>
+            <a:r>
+              <a:rPr lang="nl-BE" dirty="0"/>
+              <a:t>Sprint 1</a:t>
+            </a:r>
+          </a:p>
+        </p:txBody>
+      </p:sp>
+      <p:sp>
+        <p:nvSpPr>
+          <p:cNvPr id="3" name="Subtitle 2">
+            <a:extLst>
+              <a:ext uri="{FF2B5EF4-FFF2-40B4-BE49-F238E27FC236}">
+                <a16:creationId xmlns:a16="http://schemas.microsoft.com/office/drawing/2014/main" id="{16F05D79-76DB-438C-88CF-3FFFDCCE47AA}"/>
+              </a:ext>
+            </a:extLst>
+          </p:cNvPr>
+          <p:cNvSpPr>
+            <a:spLocks noGrp="1"/>
+          </p:cNvSpPr>
+          <p:nvPr>
+            <p:ph type="subTitle" idx="1"/>
           </p:nvPr>
         </p:nvSpPr>
         <p:spPr/>
@@ -7044,99 +7436,13 @@
               <a:t>Outliers</a:t>
             </a:r>
             <a:endParaRPr lang="nl-BE" dirty="0"/>
-          </a:p>
-        </p:txBody>
-      </p:sp>
-      <p:sp>
-        <p:nvSpPr>
-          <p:cNvPr id="3" name="Content Placeholder 2">
-            <a:extLst>
-              <a:ext uri="{FF2B5EF4-FFF2-40B4-BE49-F238E27FC236}">
-                <a16:creationId xmlns:a16="http://schemas.microsoft.com/office/drawing/2014/main" id="{44A5BE66-60D5-41E6-A546-A130CC12D40D}"/>
-              </a:ext>
-            </a:extLst>
-          </p:cNvPr>
-          <p:cNvSpPr>
-            <a:spLocks noGrp="1"/>
-          </p:cNvSpPr>
-          <p:nvPr>
-            <p:ph idx="1"/>
-          </p:nvPr>
-        </p:nvSpPr>
-        <p:spPr/>
-        <p:txBody>
-          <a:bodyPr/>
-          <a:lstStyle/>
-          <a:p>
-            <a:r>
-              <a:rPr lang="en-US" dirty="0"/>
-              <a:t>v0.01: </a:t>
-            </a:r>
-            <a:r>
-              <a:rPr lang="en-US" i="1" dirty="0" err="1"/>
-              <a:t>detect_outliers</a:t>
-            </a:r>
-            <a:r>
-              <a:rPr lang="en-US" i="1" dirty="0"/>
-              <a:t>(data)</a:t>
-            </a:r>
-          </a:p>
-          <a:p>
-            <a:pPr lvl="1"/>
-            <a:r>
-              <a:rPr lang="en-US" i="1" dirty="0"/>
-              <a:t>Uses </a:t>
-            </a:r>
-            <a:r>
-              <a:rPr lang="en-US" b="1" i="1" dirty="0"/>
-              <a:t>only</a:t>
-            </a:r>
-            <a:r>
-              <a:rPr lang="en-US" i="1" dirty="0"/>
-              <a:t> the supplied dataset</a:t>
-            </a:r>
-          </a:p>
-          <a:p>
-            <a:r>
-              <a:rPr lang="en-US" dirty="0"/>
-              <a:t>v0.02: </a:t>
-            </a:r>
-            <a:r>
-              <a:rPr lang="en-US" i="1" dirty="0" err="1"/>
-              <a:t>detect_outliers</a:t>
-            </a:r>
-            <a:r>
-              <a:rPr lang="en-US" i="1" dirty="0"/>
-              <a:t>(data, type = c(“air pressure”, “air temperature”), units)</a:t>
-            </a:r>
-          </a:p>
-          <a:p>
-            <a:pPr lvl="1"/>
-            <a:r>
-              <a:rPr lang="en-US" dirty="0"/>
-              <a:t>Uses simple </a:t>
-            </a:r>
-            <a:r>
-              <a:rPr lang="en-US" b="1" dirty="0"/>
-              <a:t>a-priori</a:t>
-            </a:r>
-            <a:r>
-              <a:rPr lang="en-US" dirty="0"/>
-              <a:t> knowledge about air pressure, temperature, etc.</a:t>
-            </a:r>
-          </a:p>
-          <a:p>
-            <a:r>
-              <a:rPr lang="en-US" dirty="0"/>
-              <a:t>v0.03: …</a:t>
-            </a:r>
           </a:p>
         </p:txBody>
       </p:sp>
     </p:spTree>
     <p:extLst>
       <p:ext uri="{BB962C8B-B14F-4D97-AF65-F5344CB8AC3E}">
-        <p14:creationId xmlns:p14="http://schemas.microsoft.com/office/powerpoint/2010/main" val="1695507499"/>
+        <p14:creationId xmlns:p14="http://schemas.microsoft.com/office/powerpoint/2010/main" val="2423986036"/>
       </p:ext>
     </p:extLst>
   </p:cSld>
@@ -7165,6 +7471,151 @@
       </p:grpSpPr>
       <p:sp>
         <p:nvSpPr>
+          <p:cNvPr id="2" name="Title 1">
+            <a:extLst>
+              <a:ext uri="{FF2B5EF4-FFF2-40B4-BE49-F238E27FC236}">
+                <a16:creationId xmlns:a16="http://schemas.microsoft.com/office/drawing/2014/main" id="{2AAF558A-3957-4364-84E1-918EECE4497A}"/>
+              </a:ext>
+            </a:extLst>
+          </p:cNvPr>
+          <p:cNvSpPr>
+            <a:spLocks noGrp="1"/>
+          </p:cNvSpPr>
+          <p:nvPr>
+            <p:ph type="title"/>
+          </p:nvPr>
+        </p:nvSpPr>
+        <p:spPr/>
+        <p:txBody>
+          <a:bodyPr/>
+          <a:lstStyle/>
+          <a:p>
+            <a:r>
+              <a:rPr lang="nl-BE" dirty="0" err="1"/>
+              <a:t>Outliers</a:t>
+            </a:r>
+            <a:endParaRPr lang="nl-BE" dirty="0"/>
+          </a:p>
+        </p:txBody>
+      </p:sp>
+      <p:sp>
+        <p:nvSpPr>
+          <p:cNvPr id="3" name="Content Placeholder 2">
+            <a:extLst>
+              <a:ext uri="{FF2B5EF4-FFF2-40B4-BE49-F238E27FC236}">
+                <a16:creationId xmlns:a16="http://schemas.microsoft.com/office/drawing/2014/main" id="{44A5BE66-60D5-41E6-A546-A130CC12D40D}"/>
+              </a:ext>
+            </a:extLst>
+          </p:cNvPr>
+          <p:cNvSpPr>
+            <a:spLocks noGrp="1"/>
+          </p:cNvSpPr>
+          <p:nvPr>
+            <p:ph idx="1"/>
+          </p:nvPr>
+        </p:nvSpPr>
+        <p:spPr/>
+        <p:txBody>
+          <a:bodyPr/>
+          <a:lstStyle/>
+          <a:p>
+            <a:r>
+              <a:rPr lang="en-US" dirty="0"/>
+              <a:t>v0.01: </a:t>
+            </a:r>
+            <a:r>
+              <a:rPr lang="en-US" i="1" dirty="0" err="1"/>
+              <a:t>detect_outliers</a:t>
+            </a:r>
+            <a:r>
+              <a:rPr lang="en-US" i="1" dirty="0"/>
+              <a:t>(data)</a:t>
+            </a:r>
+          </a:p>
+          <a:p>
+            <a:pPr lvl="1"/>
+            <a:r>
+              <a:rPr lang="en-US" i="1" dirty="0"/>
+              <a:t>Uses </a:t>
+            </a:r>
+            <a:r>
+              <a:rPr lang="en-US" b="1" i="1" dirty="0"/>
+              <a:t>only</a:t>
+            </a:r>
+            <a:r>
+              <a:rPr lang="en-US" i="1" dirty="0"/>
+              <a:t> the supplied dataset</a:t>
+            </a:r>
+          </a:p>
+          <a:p>
+            <a:r>
+              <a:rPr lang="en-US" dirty="0"/>
+              <a:t>v0.02: </a:t>
+            </a:r>
+            <a:r>
+              <a:rPr lang="en-US" i="1" dirty="0" err="1"/>
+              <a:t>detect_outliers</a:t>
+            </a:r>
+            <a:r>
+              <a:rPr lang="en-US" i="1" dirty="0"/>
+              <a:t>(data, type = c(“air pressure”, “air temperature”), units)</a:t>
+            </a:r>
+          </a:p>
+          <a:p>
+            <a:pPr lvl="1"/>
+            <a:r>
+              <a:rPr lang="en-US" dirty="0"/>
+              <a:t>Uses simple </a:t>
+            </a:r>
+            <a:r>
+              <a:rPr lang="en-US" b="1" dirty="0"/>
+              <a:t>a-priori</a:t>
+            </a:r>
+            <a:r>
+              <a:rPr lang="en-US" dirty="0"/>
+              <a:t> knowledge about air pressure, temperature, etc.</a:t>
+            </a:r>
+          </a:p>
+          <a:p>
+            <a:r>
+              <a:rPr lang="en-US" dirty="0"/>
+              <a:t>v0.03: …</a:t>
+            </a:r>
+          </a:p>
+        </p:txBody>
+      </p:sp>
+    </p:spTree>
+    <p:extLst>
+      <p:ext uri="{BB962C8B-B14F-4D97-AF65-F5344CB8AC3E}">
+        <p14:creationId xmlns:p14="http://schemas.microsoft.com/office/powerpoint/2010/main" val="1695507499"/>
+      </p:ext>
+    </p:extLst>
+  </p:cSld>
+  <p:clrMapOvr>
+    <a:masterClrMapping/>
+  </p:clrMapOvr>
+</p:sld>
+</file>
+
+<file path=ppt/slides/slide5.xml><?xml version="1.0" encoding="utf-8"?>
+<p:sld xmlns:a="http://schemas.openxmlformats.org/drawingml/2006/main" xmlns:r="http://schemas.openxmlformats.org/officeDocument/2006/relationships" xmlns:p="http://schemas.openxmlformats.org/presentationml/2006/main">
+  <p:cSld>
+    <p:spTree>
+      <p:nvGrpSpPr>
+        <p:cNvPr id="1" name=""/>
+        <p:cNvGrpSpPr/>
+        <p:nvPr/>
+      </p:nvGrpSpPr>
+      <p:grpSpPr>
+        <a:xfrm>
+          <a:off x="0" y="0"/>
+          <a:ext cx="0" cy="0"/>
+          <a:chOff x="0" y="0"/>
+          <a:chExt cx="0" cy="0"/>
+        </a:xfrm>
+      </p:grpSpPr>
+      <p:sp>
+        <p:nvSpPr>
           <p:cNvPr id="4" name="Title 3">
             <a:extLst>
               <a:ext uri="{FF2B5EF4-FFF2-40B4-BE49-F238E27FC236}">
@@ -7245,7 +7696,7 @@
 </p:sld>
 </file>
 
-<file path=ppt/slides/slide5.xml><?xml version="1.0" encoding="utf-8"?>
+<file path=ppt/slides/slide6.xml><?xml version="1.0" encoding="utf-8"?>
 <p:sld xmlns:a="http://schemas.openxmlformats.org/drawingml/2006/main" xmlns:r="http://schemas.openxmlformats.org/officeDocument/2006/relationships" xmlns:p="http://schemas.openxmlformats.org/presentationml/2006/main">
   <p:cSld>
     <p:spTree>
@@ -7372,7 +7823,7 @@
 </p:sld>
 </file>
 
-<file path=ppt/slides/slide6.xml><?xml version="1.0" encoding="utf-8"?>
+<file path=ppt/slides/slide7.xml><?xml version="1.0" encoding="utf-8"?>
 <p:sld xmlns:a="http://schemas.openxmlformats.org/drawingml/2006/main" xmlns:r="http://schemas.openxmlformats.org/officeDocument/2006/relationships" xmlns:p="http://schemas.openxmlformats.org/presentationml/2006/main">
   <p:cSld>
     <p:spTree>
@@ -7499,7 +7950,7 @@
 </p:sld>
 </file>
 
-<file path=ppt/slides/slide7.xml><?xml version="1.0" encoding="utf-8"?>
+<file path=ppt/slides/slide8.xml><?xml version="1.0" encoding="utf-8"?>
 <p:sld xmlns:a="http://schemas.openxmlformats.org/drawingml/2006/main" xmlns:r="http://schemas.openxmlformats.org/officeDocument/2006/relationships" xmlns:p="http://schemas.openxmlformats.org/presentationml/2006/main">
   <p:cSld>
     <p:spTree>
@@ -7626,7 +8077,7 @@
 </p:sld>
 </file>
 
-<file path=ppt/slides/slide8.xml><?xml version="1.0" encoding="utf-8"?>
+<file path=ppt/slides/slide9.xml><?xml version="1.0" encoding="utf-8"?>
 <p:sld xmlns:a="http://schemas.openxmlformats.org/drawingml/2006/main" xmlns:r="http://schemas.openxmlformats.org/officeDocument/2006/relationships" xmlns:p="http://schemas.openxmlformats.org/presentationml/2006/main">
   <p:cSld>
     <p:spTree>
@@ -7754,143 +8205,6 @@
     <p:extLst>
       <p:ext uri="{BB962C8B-B14F-4D97-AF65-F5344CB8AC3E}">
         <p14:creationId xmlns:p14="http://schemas.microsoft.com/office/powerpoint/2010/main" val="1050747877"/>
-      </p:ext>
-    </p:extLst>
-  </p:cSld>
-  <p:clrMapOvr>
-    <a:masterClrMapping/>
-  </p:clrMapOvr>
-</p:sld>
-</file>
-
-<file path=ppt/slides/slide9.xml><?xml version="1.0" encoding="utf-8"?>
-<p:sld xmlns:a="http://schemas.openxmlformats.org/drawingml/2006/main" xmlns:r="http://schemas.openxmlformats.org/officeDocument/2006/relationships" xmlns:p="http://schemas.openxmlformats.org/presentationml/2006/main">
-  <p:cSld>
-    <p:spTree>
-      <p:nvGrpSpPr>
-        <p:cNvPr id="1" name=""/>
-        <p:cNvGrpSpPr/>
-        <p:nvPr/>
-      </p:nvGrpSpPr>
-      <p:grpSpPr>
-        <a:xfrm>
-          <a:off x="0" y="0"/>
-          <a:ext cx="0" cy="0"/>
-          <a:chOff x="0" y="0"/>
-          <a:chExt cx="0" cy="0"/>
-        </a:xfrm>
-      </p:grpSpPr>
-      <p:sp>
-        <p:nvSpPr>
-          <p:cNvPr id="2" name="Title 1">
-            <a:extLst>
-              <a:ext uri="{FF2B5EF4-FFF2-40B4-BE49-F238E27FC236}">
-                <a16:creationId xmlns:a16="http://schemas.microsoft.com/office/drawing/2014/main" id="{6D80A9A5-3296-40DF-AB8B-E1B2FFA1A316}"/>
-              </a:ext>
-            </a:extLst>
-          </p:cNvPr>
-          <p:cNvSpPr>
-            <a:spLocks noGrp="1"/>
-          </p:cNvSpPr>
-          <p:nvPr>
-            <p:ph type="title"/>
-          </p:nvPr>
-        </p:nvSpPr>
-        <p:spPr>
-          <a:xfrm>
-            <a:off x="838200" y="365125"/>
-            <a:ext cx="10515600" cy="1325563"/>
-          </a:xfrm>
-        </p:spPr>
-        <p:txBody>
-          <a:bodyPr/>
-          <a:lstStyle/>
-          <a:p>
-            <a:r>
-              <a:rPr lang="nl-BE" dirty="0" err="1"/>
-              <a:t>Outliers</a:t>
-            </a:r>
-            <a:r>
-              <a:rPr lang="nl-BE" dirty="0"/>
-              <a:t>: v0.01</a:t>
-            </a:r>
-            <a:endParaRPr lang="en-US" dirty="0"/>
-          </a:p>
-        </p:txBody>
-      </p:sp>
-      <p:sp>
-        <p:nvSpPr>
-          <p:cNvPr id="3" name="Content Placeholder 2">
-            <a:extLst>
-              <a:ext uri="{FF2B5EF4-FFF2-40B4-BE49-F238E27FC236}">
-                <a16:creationId xmlns:a16="http://schemas.microsoft.com/office/drawing/2014/main" id="{B684F9E5-F86E-4C22-A298-BAF6033EAD66}"/>
-              </a:ext>
-            </a:extLst>
-          </p:cNvPr>
-          <p:cNvSpPr>
-            <a:spLocks noGrp="1"/>
-          </p:cNvSpPr>
-          <p:nvPr>
-            <p:ph idx="1"/>
-          </p:nvPr>
-        </p:nvSpPr>
-        <p:spPr>
-          <a:xfrm>
-            <a:off x="838200" y="1825625"/>
-            <a:ext cx="10515600" cy="4351338"/>
-          </a:xfrm>
-        </p:spPr>
-        <p:txBody>
-          <a:bodyPr/>
-          <a:lstStyle/>
-          <a:p>
-            <a:r>
-              <a:rPr lang="en-US">
-                <a:hlinkClick r:id="rId2"/>
-              </a:rPr>
-              <a:t>Validation</a:t>
-            </a:r>
-            <a:endParaRPr lang="en-US"/>
-          </a:p>
-          <a:p>
-            <a:endParaRPr lang="en-US" dirty="0"/>
-          </a:p>
-        </p:txBody>
-      </p:sp>
-      <p:pic>
-        <p:nvPicPr>
-          <p:cNvPr id="5" name="Picture 4">
-            <a:extLst>
-              <a:ext uri="{FF2B5EF4-FFF2-40B4-BE49-F238E27FC236}">
-                <a16:creationId xmlns:a16="http://schemas.microsoft.com/office/drawing/2014/main" id="{3E1F0056-CB14-41C4-8E1B-2717D99E04BA}"/>
-              </a:ext>
-            </a:extLst>
-          </p:cNvPr>
-          <p:cNvPicPr>
-            <a:picLocks noChangeAspect="1"/>
-          </p:cNvPicPr>
-          <p:nvPr/>
-        </p:nvPicPr>
-        <p:blipFill>
-          <a:blip r:embed="rId3"/>
-          <a:stretch>
-            <a:fillRect/>
-          </a:stretch>
-        </p:blipFill>
-        <p:spPr>
-          <a:xfrm>
-            <a:off x="2136000" y="2531485"/>
-            <a:ext cx="7920000" cy="3961390"/>
-          </a:xfrm>
-          <a:prstGeom prst="rect">
-            <a:avLst/>
-          </a:prstGeom>
-        </p:spPr>
-      </p:pic>
-    </p:spTree>
-    <p:extLst>
-      <p:ext uri="{BB962C8B-B14F-4D97-AF65-F5344CB8AC3E}">
-        <p14:creationId xmlns:p14="http://schemas.microsoft.com/office/powerpoint/2010/main" val="3977042041"/>
       </p:ext>
     </p:extLst>
   </p:cSld>

</xml_diff>